<commit_message>
Zwave-Arrowhead Course Project commit 07-01-21
</commit_message>
<xml_diff>
--- a/Arrowhead Zwave System - IOT.pptx
+++ b/Arrowhead Zwave System - IOT.pptx
@@ -19527,9 +19527,12 @@
 </file>
 
 <file path=customXml/item1.xml><?xml version="1.0" encoding="utf-8"?>
-<p:properties xmlns:p="http://schemas.microsoft.com/office/2006/metadata/properties" xmlns:xsi="http://www.w3.org/2001/XMLSchema-instance" xmlns:pc="http://schemas.microsoft.com/office/infopath/2007/PartnerControls">
-  <documentManagement/>
-</p:properties>
+<?mso-contentType ?>
+<FormTemplates xmlns="http://schemas.microsoft.com/sharepoint/v3/contenttype/forms">
+  <Display>DocumentLibraryForm</Display>
+  <Edit>DocumentLibraryForm</Edit>
+  <New>DocumentLibraryForm</New>
+</FormTemplates>
 </file>
 
 <file path=customXml/item2.xml><?xml version="1.0" encoding="utf-8"?>
@@ -19730,27 +19733,15 @@
 </file>
 
 <file path=customXml/item3.xml><?xml version="1.0" encoding="utf-8"?>
-<?mso-contentType ?>
-<FormTemplates xmlns="http://schemas.microsoft.com/sharepoint/v3/contenttype/forms">
-  <Display>DocumentLibraryForm</Display>
-  <Edit>DocumentLibraryForm</Edit>
-  <New>DocumentLibraryForm</New>
-</FormTemplates>
+<p:properties xmlns:p="http://schemas.microsoft.com/office/2006/metadata/properties" xmlns:xsi="http://www.w3.org/2001/XMLSchema-instance" xmlns:pc="http://schemas.microsoft.com/office/infopath/2007/PartnerControls">
+  <documentManagement/>
+</p:properties>
 </file>
 
 <file path=customXml/itemProps1.xml><?xml version="1.0" encoding="utf-8"?>
-<ds:datastoreItem xmlns:ds="http://schemas.openxmlformats.org/officeDocument/2006/customXml" ds:itemID="{27148DB2-E5E4-4A0B-B2B4-A21BBC8783AD}">
+<ds:datastoreItem xmlns:ds="http://schemas.openxmlformats.org/officeDocument/2006/customXml" ds:itemID="{EA086501-7160-422F-8E63-A756F455A83A}">
   <ds:schemaRefs>
-    <ds:schemaRef ds:uri="http://purl.org/dc/elements/1.1/"/>
-    <ds:schemaRef ds:uri="http://schemas.microsoft.com/office/2006/metadata/properties"/>
-    <ds:schemaRef ds:uri="http://schemas.microsoft.com/office/2006/documentManagement/types"/>
-    <ds:schemaRef ds:uri="http://purl.org/dc/terms/"/>
-    <ds:schemaRef ds:uri="http://schemas.openxmlformats.org/package/2006/metadata/core-properties"/>
-    <ds:schemaRef ds:uri="95c5fae2-f108-46da-8d18-9c5f19862b03"/>
-    <ds:schemaRef ds:uri="http://purl.org/dc/dcmitype/"/>
-    <ds:schemaRef ds:uri="http://schemas.microsoft.com/office/infopath/2007/PartnerControls"/>
-    <ds:schemaRef ds:uri="33539a01-0373-447d-a583-ee4ac2448f00"/>
-    <ds:schemaRef ds:uri="http://www.w3.org/XML/1998/namespace"/>
+    <ds:schemaRef ds:uri="http://schemas.microsoft.com/sharepoint/v3/contenttype/forms"/>
   </ds:schemaRefs>
 </ds:datastoreItem>
 </file>
@@ -19775,9 +19766,18 @@
 </file>
 
 <file path=customXml/itemProps3.xml><?xml version="1.0" encoding="utf-8"?>
-<ds:datastoreItem xmlns:ds="http://schemas.openxmlformats.org/officeDocument/2006/customXml" ds:itemID="{EA086501-7160-422F-8E63-A756F455A83A}">
+<ds:datastoreItem xmlns:ds="http://schemas.openxmlformats.org/officeDocument/2006/customXml" ds:itemID="{27148DB2-E5E4-4A0B-B2B4-A21BBC8783AD}">
   <ds:schemaRefs>
-    <ds:schemaRef ds:uri="http://schemas.microsoft.com/sharepoint/v3/contenttype/forms"/>
+    <ds:schemaRef ds:uri="http://www.w3.org/XML/1998/namespace"/>
+    <ds:schemaRef ds:uri="http://schemas.microsoft.com/office/2006/documentManagement/types"/>
+    <ds:schemaRef ds:uri="95c5fae2-f108-46da-8d18-9c5f19862b03"/>
+    <ds:schemaRef ds:uri="http://schemas.microsoft.com/office/2006/metadata/properties"/>
+    <ds:schemaRef ds:uri="http://purl.org/dc/dcmitype/"/>
+    <ds:schemaRef ds:uri="http://schemas.openxmlformats.org/package/2006/metadata/core-properties"/>
+    <ds:schemaRef ds:uri="http://purl.org/dc/elements/1.1/"/>
+    <ds:schemaRef ds:uri="http://purl.org/dc/terms/"/>
+    <ds:schemaRef ds:uri="http://schemas.microsoft.com/office/infopath/2007/PartnerControls"/>
+    <ds:schemaRef ds:uri="33539a01-0373-447d-a583-ee4ac2448f00"/>
   </ds:schemaRefs>
 </ds:datastoreItem>
 </file>
</xml_diff>